<commit_message>
fixed formatting issues in pptx
</commit_message>
<xml_diff>
--- a/docs/ppt/DATOM-all-canvas.pptx
+++ b/docs/ppt/DATOM-all-canvas.pptx
@@ -119,6 +119,11 @@
       </a:defRPr>
     </a:lvl9pPr>
   </p:defaultTextStyle>
+  <p:extLst>
+    <p:ext uri="{EFAFB233-063F-42B5-8137-9DF3F51BA10A}">
+      <p15:sldGuideLst xmlns:p15="http://schemas.microsoft.com/office/powerpoint/2012/main"/>
+    </p:ext>
+  </p:extLst>
 </p:presentation>
 </file>
 
@@ -204,7 +209,7 @@
           <a:p>
             <a:fld id="{2A22C813-1A7B-4400-8580-E7E9B7C06A82}" type="datetimeFigureOut">
               <a:rPr lang="fr-FR" smtClean="0"/>
-              <a:t>17/09/2018</a:t>
+              <a:t>19/09/2018</a:t>
             </a:fld>
             <a:endParaRPr lang="fr-FR"/>
           </a:p>
@@ -1693,7 +1698,7 @@
           <a:p>
             <a:fld id="{B234671C-B7D6-4DE1-AFF7-0A568AA987DA}" type="datetimeFigureOut">
               <a:rPr lang="fr-FR" smtClean="0"/>
-              <a:t>17/09/2018</a:t>
+              <a:t>19/09/2018</a:t>
             </a:fld>
             <a:endParaRPr lang="fr-FR"/>
           </a:p>
@@ -1863,7 +1868,7 @@
           <a:p>
             <a:fld id="{B234671C-B7D6-4DE1-AFF7-0A568AA987DA}" type="datetimeFigureOut">
               <a:rPr lang="fr-FR" smtClean="0"/>
-              <a:t>17/09/2018</a:t>
+              <a:t>19/09/2018</a:t>
             </a:fld>
             <a:endParaRPr lang="fr-FR"/>
           </a:p>
@@ -2043,7 +2048,7 @@
           <a:p>
             <a:fld id="{B234671C-B7D6-4DE1-AFF7-0A568AA987DA}" type="datetimeFigureOut">
               <a:rPr lang="fr-FR" smtClean="0"/>
-              <a:t>17/09/2018</a:t>
+              <a:t>19/09/2018</a:t>
             </a:fld>
             <a:endParaRPr lang="fr-FR"/>
           </a:p>
@@ -2958,7 +2963,7 @@
           <a:p>
             <a:fld id="{B234671C-B7D6-4DE1-AFF7-0A568AA987DA}" type="datetimeFigureOut">
               <a:rPr lang="fr-FR" smtClean="0"/>
-              <a:t>17/09/2018</a:t>
+              <a:t>19/09/2018</a:t>
             </a:fld>
             <a:endParaRPr lang="fr-FR"/>
           </a:p>
@@ -3204,7 +3209,7 @@
           <a:p>
             <a:fld id="{B234671C-B7D6-4DE1-AFF7-0A568AA987DA}" type="datetimeFigureOut">
               <a:rPr lang="fr-FR" smtClean="0"/>
-              <a:t>17/09/2018</a:t>
+              <a:t>19/09/2018</a:t>
             </a:fld>
             <a:endParaRPr lang="fr-FR"/>
           </a:p>
@@ -3436,7 +3441,7 @@
           <a:p>
             <a:fld id="{B234671C-B7D6-4DE1-AFF7-0A568AA987DA}" type="datetimeFigureOut">
               <a:rPr lang="fr-FR" smtClean="0"/>
-              <a:t>17/09/2018</a:t>
+              <a:t>19/09/2018</a:t>
             </a:fld>
             <a:endParaRPr lang="fr-FR"/>
           </a:p>
@@ -3803,7 +3808,7 @@
           <a:p>
             <a:fld id="{B234671C-B7D6-4DE1-AFF7-0A568AA987DA}" type="datetimeFigureOut">
               <a:rPr lang="fr-FR" smtClean="0"/>
-              <a:t>17/09/2018</a:t>
+              <a:t>19/09/2018</a:t>
             </a:fld>
             <a:endParaRPr lang="fr-FR"/>
           </a:p>
@@ -3921,7 +3926,7 @@
           <a:p>
             <a:fld id="{B234671C-B7D6-4DE1-AFF7-0A568AA987DA}" type="datetimeFigureOut">
               <a:rPr lang="fr-FR" smtClean="0"/>
-              <a:t>17/09/2018</a:t>
+              <a:t>19/09/2018</a:t>
             </a:fld>
             <a:endParaRPr lang="fr-FR"/>
           </a:p>
@@ -4016,7 +4021,7 @@
           <a:p>
             <a:fld id="{B234671C-B7D6-4DE1-AFF7-0A568AA987DA}" type="datetimeFigureOut">
               <a:rPr lang="fr-FR" smtClean="0"/>
-              <a:t>17/09/2018</a:t>
+              <a:t>19/09/2018</a:t>
             </a:fld>
             <a:endParaRPr lang="fr-FR"/>
           </a:p>
@@ -4293,7 +4298,7 @@
           <a:p>
             <a:fld id="{B234671C-B7D6-4DE1-AFF7-0A568AA987DA}" type="datetimeFigureOut">
               <a:rPr lang="fr-FR" smtClean="0"/>
-              <a:t>17/09/2018</a:t>
+              <a:t>19/09/2018</a:t>
             </a:fld>
             <a:endParaRPr lang="fr-FR"/>
           </a:p>
@@ -4546,7 +4551,7 @@
           <a:p>
             <a:fld id="{B234671C-B7D6-4DE1-AFF7-0A568AA987DA}" type="datetimeFigureOut">
               <a:rPr lang="fr-FR" smtClean="0"/>
-              <a:t>17/09/2018</a:t>
+              <a:t>19/09/2018</a:t>
             </a:fld>
             <a:endParaRPr lang="fr-FR"/>
           </a:p>
@@ -4759,7 +4764,7 @@
           <a:p>
             <a:fld id="{B234671C-B7D6-4DE1-AFF7-0A568AA987DA}" type="datetimeFigureOut">
               <a:rPr lang="fr-FR" smtClean="0"/>
-              <a:t>17/09/2018</a:t>
+              <a:t>19/09/2018</a:t>
             </a:fld>
             <a:endParaRPr lang="fr-FR"/>
           </a:p>
@@ -9680,15 +9685,6 @@
               </a:rPr>
               <a:t>Datasets / data sources contributing to the idea</a:t>
             </a:r>
-            <a:endParaRPr lang="en-US" dirty="0">
-              <a:solidFill>
-                <a:srgbClr val="FFFFFF"/>
-              </a:solidFill>
-              <a:latin typeface="Century Gothic"/>
-              <a:ea typeface="Century Gothic"/>
-              <a:cs typeface="Century Gothic"/>
-              <a:sym typeface="Century Gothic"/>
-            </a:endParaRPr>
           </a:p>
         </p:txBody>
       </p:sp>
@@ -12529,7 +12525,7 @@
           </a:bodyPr>
           <a:lstStyle/>
           <a:p>
-            <a:endParaRPr/>
+            <a:endParaRPr sz="1600"/>
           </a:p>
         </p:txBody>
       </p:sp>
@@ -12565,10 +12561,10 @@
           <a:lstStyle/>
           <a:p>
             <a:r>
-              <a:rPr lang="en" sz="1200"/>
+              <a:rPr lang="en" sz="1100"/>
               <a:t>What frustrations do they experience?</a:t>
             </a:r>
-            <a:endParaRPr sz="1200"/>
+            <a:endParaRPr sz="1100"/>
           </a:p>
         </p:txBody>
       </p:sp>
@@ -12598,17 +12594,17 @@
           <a:lstStyle/>
           <a:p>
             <a:r>
-              <a:rPr lang="en" sz="1600" b="1"/>
+              <a:rPr lang="en" sz="1400" b="1"/>
               <a:t>Canvas #04</a:t>
             </a:r>
-            <a:endParaRPr sz="1600" b="1"/>
-          </a:p>
-          <a:p>
-            <a:r>
-              <a:rPr lang="en" sz="1600" b="1"/>
+            <a:endParaRPr sz="1400" b="1"/>
+          </a:p>
+          <a:p>
+            <a:r>
+              <a:rPr lang="en" sz="1400" b="1"/>
               <a:t>Customer needs analysis</a:t>
             </a:r>
-            <a:endParaRPr sz="1600" b="1"/>
+            <a:endParaRPr sz="1400" b="1"/>
           </a:p>
         </p:txBody>
       </p:sp>
@@ -12638,10 +12634,10 @@
           <a:lstStyle/>
           <a:p>
             <a:r>
-              <a:rPr lang="en" dirty="0"/>
+              <a:rPr lang="en" sz="1600" dirty="0"/>
               <a:t>Designed by: __________________________</a:t>
             </a:r>
-            <a:endParaRPr dirty="0"/>
+            <a:endParaRPr sz="1600" dirty="0"/>
           </a:p>
         </p:txBody>
       </p:sp>
@@ -12671,10 +12667,10 @@
           <a:lstStyle/>
           <a:p>
             <a:r>
-              <a:rPr lang="en"/>
+              <a:rPr lang="en" sz="1600"/>
               <a:t>Date: 	   ___________________________</a:t>
             </a:r>
-            <a:endParaRPr/>
+            <a:endParaRPr sz="1600"/>
           </a:p>
         </p:txBody>
       </p:sp>
@@ -12714,7 +12710,7 @@
           </a:bodyPr>
           <a:lstStyle/>
           <a:p>
-            <a:endParaRPr/>
+            <a:endParaRPr sz="1600"/>
           </a:p>
         </p:txBody>
       </p:sp>
@@ -12754,7 +12750,7 @@
           </a:bodyPr>
           <a:lstStyle/>
           <a:p>
-            <a:endParaRPr/>
+            <a:endParaRPr sz="1600"/>
           </a:p>
         </p:txBody>
       </p:sp>
@@ -12766,8 +12762,8 @@
         </p:nvSpPr>
         <p:spPr>
           <a:xfrm>
-            <a:off x="2310175" y="736075"/>
-            <a:ext cx="3128400" cy="503700"/>
+            <a:off x="2310175" y="700215"/>
+            <a:ext cx="4207166" cy="503700"/>
           </a:xfrm>
           <a:prstGeom prst="rect">
             <a:avLst/>
@@ -12784,10 +12780,10 @@
           <a:lstStyle/>
           <a:p>
             <a:r>
-              <a:rPr lang="en"/>
+              <a:rPr lang="en" sz="1600" dirty="0"/>
               <a:t>What resource do they need to perform their task?</a:t>
             </a:r>
-            <a:endParaRPr/>
+            <a:endParaRPr sz="1600" dirty="0"/>
           </a:p>
         </p:txBody>
       </p:sp>
@@ -12799,8 +12795,8 @@
         </p:nvSpPr>
         <p:spPr>
           <a:xfrm>
-            <a:off x="7361475" y="871600"/>
-            <a:ext cx="2856600" cy="320100"/>
+            <a:off x="6978145" y="754986"/>
+            <a:ext cx="3099130" cy="436697"/>
           </a:xfrm>
           <a:prstGeom prst="rect">
             <a:avLst/>
@@ -12817,10 +12813,10 @@
           <a:lstStyle/>
           <a:p>
             <a:r>
-              <a:rPr lang="en"/>
+              <a:rPr lang="en" sz="1600" dirty="0"/>
               <a:t>What do they need to deliver?</a:t>
             </a:r>
-            <a:endParaRPr/>
+            <a:endParaRPr sz="1600" dirty="0"/>
           </a:p>
         </p:txBody>
       </p:sp>
@@ -12850,10 +12846,10 @@
           <a:lstStyle/>
           <a:p>
             <a:r>
-              <a:rPr lang="en"/>
+              <a:rPr lang="en" sz="1600"/>
               <a:t>What constraints do they face? (time? budget? distance? legal? etc.)</a:t>
             </a:r>
-            <a:endParaRPr/>
+            <a:endParaRPr sz="1600"/>
           </a:p>
         </p:txBody>
       </p:sp>
@@ -12893,7 +12889,7 @@
           </a:bodyPr>
           <a:lstStyle/>
           <a:p>
-            <a:endParaRPr/>
+            <a:endParaRPr sz="1600"/>
           </a:p>
         </p:txBody>
       </p:sp>
@@ -12928,7 +12924,7 @@
           </a:bodyPr>
           <a:lstStyle/>
           <a:p>
-            <a:endParaRPr/>
+            <a:endParaRPr sz="1600"/>
           </a:p>
         </p:txBody>
       </p:sp>
@@ -12963,7 +12959,7 @@
           </a:bodyPr>
           <a:lstStyle/>
           <a:p>
-            <a:endParaRPr/>
+            <a:endParaRPr sz="1600"/>
           </a:p>
         </p:txBody>
       </p:sp>
@@ -12975,8 +12971,8 @@
         </p:nvSpPr>
         <p:spPr>
           <a:xfrm>
-            <a:off x="7773975" y="5973400"/>
-            <a:ext cx="2568300" cy="537600"/>
+            <a:off x="6836375" y="5903669"/>
+            <a:ext cx="3240900" cy="537600"/>
           </a:xfrm>
           <a:prstGeom prst="rect">
             <a:avLst/>
@@ -12993,10 +12989,10 @@
           <a:lstStyle/>
           <a:p>
             <a:r>
-              <a:rPr lang="en" sz="1200"/>
+              <a:rPr lang="en" sz="1400" dirty="0"/>
               <a:t>What rewards do they expect from it? (mention KPIs if relevant)</a:t>
             </a:r>
-            <a:endParaRPr sz="1200"/>
+            <a:endParaRPr sz="1400" dirty="0"/>
           </a:p>
         </p:txBody>
       </p:sp>
@@ -13031,7 +13027,7 @@
           </a:bodyPr>
           <a:lstStyle/>
           <a:p>
-            <a:endParaRPr/>
+            <a:endParaRPr sz="1600"/>
           </a:p>
         </p:txBody>
       </p:sp>
@@ -13071,7 +13067,7 @@
           </a:bodyPr>
           <a:lstStyle/>
           <a:p>
-            <a:endParaRPr/>
+            <a:endParaRPr sz="1600"/>
           </a:p>
         </p:txBody>
       </p:sp>
@@ -13106,7 +13102,7 @@
           </a:bodyPr>
           <a:lstStyle/>
           <a:p>
-            <a:endParaRPr/>
+            <a:endParaRPr sz="1600"/>
           </a:p>
         </p:txBody>
       </p:sp>
@@ -13162,10 +13158,10 @@
           <a:lstStyle/>
           <a:p>
             <a:r>
-              <a:rPr lang="en" sz="800" b="1"/>
+              <a:rPr lang="en" sz="700" b="1"/>
               <a:t>Copyright © 2017, Guillaume Lecuyer and Clément levallois. DATOM is for you to use without restriction in modeling your own or other people's businesses. If you wish to use the DATOM in original or adapted to sell it as a tool, you must contact the copyright holders, Clément Levallois and Guillaume Lecuyer, for permission.</a:t>
             </a:r>
-            <a:endParaRPr sz="800"/>
+            <a:endParaRPr sz="700"/>
           </a:p>
         </p:txBody>
       </p:sp>

</xml_diff>